<commit_message>
updating slides lec 1 for new setup
</commit_message>
<xml_diff>
--- a/slides/Lecture_01_Intro.pptx
+++ b/slides/Lecture_01_Intro.pptx
@@ -204,7 +204,7 @@
           <a:p>
             <a:fld id="{92C08CDA-29C6-4C4F-9345-278F31C990CA}" type="datetimeFigureOut">
               <a:rPr lang="en-GB" smtClean="0"/>
-              <a:t>26/01/2024</a:t>
+              <a:t>01/09/2024</a:t>
             </a:fld>
             <a:endParaRPr lang="en-GB"/>
           </a:p>
@@ -2887,7 +2887,7 @@
                 <a:ea typeface="Open Sans" panose="020B0606030504020204" pitchFamily="34" charset="0"/>
                 <a:cs typeface="Open Sans" panose="020B0606030504020204" pitchFamily="34" charset="0"/>
               </a:rPr>
-              <a:t>Katherine Atkins, PhD </a:t>
+              <a:t>Nicholas Davies, PhD </a:t>
             </a:r>
             <a:r>
               <a:rPr lang="en-GB" sz="2000" b="0" i="0" dirty="0">
@@ -2900,7 +2900,7 @@
                 <a:cs typeface="Open Sans" panose="020B0606030504020204" pitchFamily="34" charset="0"/>
                 <a:hlinkClick r:id="rId2"/>
               </a:rPr>
-              <a:t>Katherine.Atkins@lshtm.ac.uk</a:t>
+              <a:t>Nicholas.Davies@lshtm.ac.uk</a:t>
             </a:r>
             <a:endParaRPr lang="en-GB" sz="2000" b="0" i="0" dirty="0">
               <a:solidFill>
@@ -2923,7 +2923,7 @@
                 <a:ea typeface="Open Sans" panose="020B0606030504020204" pitchFamily="34" charset="0"/>
                 <a:cs typeface="Open Sans" panose="020B0606030504020204" pitchFamily="34" charset="0"/>
               </a:rPr>
-              <a:t>Roz Eggo, PhD </a:t>
+              <a:t>Yang Liu, PhD </a:t>
             </a:r>
             <a:r>
               <a:rPr lang="en-GB" sz="2000" dirty="0">
@@ -2935,77 +2935,6 @@
                 <a:cs typeface="Open Sans" panose="020B0606030504020204" pitchFamily="34" charset="0"/>
                 <a:hlinkClick r:id="rId3"/>
               </a:rPr>
-              <a:t>r.eggo@lshtm.ac.uk</a:t>
-            </a:r>
-            <a:endParaRPr lang="en-GB" sz="2000" b="0" i="0" dirty="0">
-              <a:solidFill>
-                <a:srgbClr val="605E5C"/>
-              </a:solidFill>
-              <a:effectLst/>
-              <a:latin typeface="Open Sans" panose="020B0606030504020204" pitchFamily="34" charset="0"/>
-              <a:ea typeface="Open Sans" panose="020B0606030504020204" pitchFamily="34" charset="0"/>
-              <a:cs typeface="Open Sans" panose="020B0606030504020204" pitchFamily="34" charset="0"/>
-            </a:endParaRPr>
-          </a:p>
-          <a:p>
-            <a:pPr marL="285750" indent="-285750">
-              <a:buFont typeface="Arial" panose="020B0604020202020204" pitchFamily="34" charset="0"/>
-              <a:buChar char="•"/>
-            </a:pPr>
-            <a:r>
-              <a:rPr lang="en-GB" sz="2000" dirty="0">
-                <a:latin typeface="Open Sans" panose="020B0606030504020204" pitchFamily="34" charset="0"/>
-                <a:ea typeface="Open Sans" panose="020B0606030504020204" pitchFamily="34" charset="0"/>
-                <a:cs typeface="Open Sans" panose="020B0606030504020204" pitchFamily="34" charset="0"/>
-              </a:rPr>
-              <a:t>Nicholas Davies, PhD </a:t>
-            </a:r>
-            <a:r>
-              <a:rPr lang="en-GB" sz="2000" b="0" i="0" dirty="0">
-                <a:solidFill>
-                  <a:srgbClr val="605E5C"/>
-                </a:solidFill>
-                <a:effectLst/>
-                <a:latin typeface="Open Sans" panose="020B0606030504020204" pitchFamily="34" charset="0"/>
-                <a:ea typeface="Open Sans" panose="020B0606030504020204" pitchFamily="34" charset="0"/>
-                <a:cs typeface="Open Sans" panose="020B0606030504020204" pitchFamily="34" charset="0"/>
-                <a:hlinkClick r:id="rId4"/>
-              </a:rPr>
-              <a:t>Nicholas.Davies@lshtm.ac.uk</a:t>
-            </a:r>
-            <a:endParaRPr lang="en-GB" sz="2000" b="0" i="0" dirty="0">
-              <a:solidFill>
-                <a:srgbClr val="605E5C"/>
-              </a:solidFill>
-              <a:effectLst/>
-              <a:latin typeface="Open Sans" panose="020B0606030504020204" pitchFamily="34" charset="0"/>
-              <a:ea typeface="Open Sans" panose="020B0606030504020204" pitchFamily="34" charset="0"/>
-              <a:cs typeface="Open Sans" panose="020B0606030504020204" pitchFamily="34" charset="0"/>
-            </a:endParaRPr>
-          </a:p>
-          <a:p>
-            <a:pPr marL="285750" indent="-285750">
-              <a:buFont typeface="Arial" panose="020B0604020202020204" pitchFamily="34" charset="0"/>
-              <a:buChar char="•"/>
-            </a:pPr>
-            <a:r>
-              <a:rPr lang="en-GB" sz="2000" dirty="0">
-                <a:latin typeface="Open Sans" panose="020B0606030504020204" pitchFamily="34" charset="0"/>
-                <a:ea typeface="Open Sans" panose="020B0606030504020204" pitchFamily="34" charset="0"/>
-                <a:cs typeface="Open Sans" panose="020B0606030504020204" pitchFamily="34" charset="0"/>
-              </a:rPr>
-              <a:t>Yang Liu, PhD </a:t>
-            </a:r>
-            <a:r>
-              <a:rPr lang="en-GB" sz="2000" dirty="0">
-                <a:solidFill>
-                  <a:srgbClr val="605E5C"/>
-                </a:solidFill>
-                <a:latin typeface="Open Sans" panose="020B0606030504020204" pitchFamily="34" charset="0"/>
-                <a:ea typeface="Open Sans" panose="020B0606030504020204" pitchFamily="34" charset="0"/>
-                <a:cs typeface="Open Sans" panose="020B0606030504020204" pitchFamily="34" charset="0"/>
-                <a:hlinkClick r:id="rId5"/>
-              </a:rPr>
               <a:t>Yang.Liu@lshtm.ac.uk</a:t>
             </a:r>
             <a:endParaRPr lang="en-GB" sz="2000" dirty="0">
@@ -3018,7 +2947,38 @@
             </a:endParaRPr>
           </a:p>
           <a:p>
-            <a:endParaRPr lang="en-GB" sz="2000" dirty="0">
+            <a:pPr marL="285750" indent="-285750">
+              <a:buFont typeface="Arial" panose="020B0604020202020204" pitchFamily="34" charset="0"/>
+              <a:buChar char="•"/>
+            </a:pPr>
+            <a:r>
+              <a:rPr lang="en-GB" sz="2000" dirty="0">
+                <a:latin typeface="Open Sans" panose="020B0606030504020204" pitchFamily="34" charset="0"/>
+                <a:ea typeface="Open Sans" panose="020B0606030504020204" pitchFamily="34" charset="0"/>
+                <a:cs typeface="Open Sans" panose="020B0606030504020204" pitchFamily="34" charset="0"/>
+              </a:rPr>
+              <a:t>Oli Brady, PhD </a:t>
+            </a:r>
+            <a:r>
+              <a:rPr lang="en-GB" sz="2000" dirty="0">
+                <a:latin typeface="Open Sans" panose="020B0606030504020204" pitchFamily="34" charset="0"/>
+                <a:ea typeface="Open Sans" panose="020B0606030504020204" pitchFamily="34" charset="0"/>
+                <a:cs typeface="Open Sans" panose="020B0606030504020204" pitchFamily="34" charset="0"/>
+                <a:hlinkClick r:id="rId4"/>
+              </a:rPr>
+              <a:t>Oliver.Brady@lshtm.ac.uk</a:t>
+            </a:r>
+            <a:r>
+              <a:rPr lang="en-GB" sz="2000" dirty="0">
+                <a:latin typeface="Open Sans" panose="020B0606030504020204" pitchFamily="34" charset="0"/>
+                <a:ea typeface="Open Sans" panose="020B0606030504020204" pitchFamily="34" charset="0"/>
+                <a:cs typeface="Open Sans" panose="020B0606030504020204" pitchFamily="34" charset="0"/>
+              </a:rPr>
+              <a:t> </a:t>
+            </a:r>
+          </a:p>
+          <a:p>
+            <a:endParaRPr lang="en-GB" sz="2000" b="1" dirty="0">
               <a:latin typeface="Open Sans" panose="020B0606030504020204" pitchFamily="34" charset="0"/>
               <a:ea typeface="Open Sans" panose="020B0606030504020204" pitchFamily="34" charset="0"/>
               <a:cs typeface="Open Sans" panose="020B0606030504020204" pitchFamily="34" charset="0"/>
@@ -3052,7 +3012,7 @@
                 <a:latin typeface="Open Sans" panose="020B0606030504020204" pitchFamily="34" charset="0"/>
                 <a:ea typeface="Open Sans" panose="020B0606030504020204" pitchFamily="34" charset="0"/>
                 <a:cs typeface="Open Sans" panose="020B0606030504020204" pitchFamily="34" charset="0"/>
-                <a:hlinkClick r:id="rId6"/>
+                <a:hlinkClick r:id="rId5"/>
               </a:rPr>
               <a:t>Damian.Keane@lshtm.ac.uk</a:t>
             </a:r>
@@ -3090,7 +3050,7 @@
                 <a:ea typeface="Open Sans" panose="020B0606030504020204" pitchFamily="34" charset="0"/>
                 <a:cs typeface="Open Sans" panose="020B0606030504020204" pitchFamily="34" charset="0"/>
               </a:rPr>
-              <a:t>Johnny Filipe, David Hodgson, Alexis Robert, Alex Richards, Billy </a:t>
+              <a:t>Billy </a:t>
             </a:r>
             <a:r>
               <a:rPr lang="en-GB" sz="2000" dirty="0" err="1">
@@ -3106,7 +3066,7 @@
                 <a:ea typeface="Open Sans" panose="020B0606030504020204" pitchFamily="34" charset="0"/>
                 <a:cs typeface="Open Sans" panose="020B0606030504020204" pitchFamily="34" charset="0"/>
               </a:rPr>
-              <a:t>, Sam Abbott, </a:t>
+              <a:t>, Kath O’Reilly, Seb Funk, Johnny Filipe, Alexis Robert, Alex Richards, </a:t>
             </a:r>
             <a:r>
               <a:rPr lang="en-GB" sz="2000" dirty="0" err="1">
@@ -3122,38 +3082,7 @@
                 <a:ea typeface="Open Sans" panose="020B0606030504020204" pitchFamily="34" charset="0"/>
                 <a:cs typeface="Open Sans" panose="020B0606030504020204" pitchFamily="34" charset="0"/>
               </a:rPr>
-              <a:t> Abbas, Carl Pearson, </a:t>
-            </a:r>
-            <a:r>
-              <a:rPr lang="en-GB" sz="2000" dirty="0" err="1">
-                <a:latin typeface="Open Sans" panose="020B0606030504020204" pitchFamily="34" charset="0"/>
-                <a:ea typeface="Open Sans" panose="020B0606030504020204" pitchFamily="34" charset="0"/>
-                <a:cs typeface="Open Sans" panose="020B0606030504020204" pitchFamily="34" charset="0"/>
-              </a:rPr>
-              <a:t>Seb</a:t>
-            </a:r>
-            <a:r>
-              <a:rPr lang="en-GB" sz="2000" dirty="0">
-                <a:latin typeface="Open Sans" panose="020B0606030504020204" pitchFamily="34" charset="0"/>
-                <a:ea typeface="Open Sans" panose="020B0606030504020204" pitchFamily="34" charset="0"/>
-                <a:cs typeface="Open Sans" panose="020B0606030504020204" pitchFamily="34" charset="0"/>
-              </a:rPr>
-              <a:t> Funk, Han Fu</a:t>
-            </a:r>
-            <a:br>
-              <a:rPr lang="en-GB" sz="2000" dirty="0">
-                <a:latin typeface="Open Sans" panose="020B0606030504020204" pitchFamily="34" charset="0"/>
-                <a:ea typeface="Open Sans" panose="020B0606030504020204" pitchFamily="34" charset="0"/>
-                <a:cs typeface="Open Sans" panose="020B0606030504020204" pitchFamily="34" charset="0"/>
-              </a:rPr>
-            </a:br>
-            <a:r>
-              <a:rPr lang="en-GB" sz="2000" dirty="0">
-                <a:latin typeface="Open Sans" panose="020B0606030504020204" pitchFamily="34" charset="0"/>
-                <a:ea typeface="Open Sans" panose="020B0606030504020204" pitchFamily="34" charset="0"/>
-                <a:cs typeface="Open Sans" panose="020B0606030504020204" pitchFamily="34" charset="0"/>
-              </a:rPr>
-              <a:t>(All LSHTM / CMMID-based)</a:t>
+              <a:t> Abbas (All LSHTM / CMMID-based)</a:t>
             </a:r>
           </a:p>
         </p:txBody>
@@ -3821,50 +3750,53 @@
             </a:pPr>
             <a:r>
               <a:rPr lang="en-GB" sz="2000" dirty="0"/>
-              <a:t>All course information (timetable, links etc) on Moodle </a:t>
-            </a:r>
-            <a:r>
-              <a:rPr lang="en-GB" sz="1800" dirty="0">
-                <a:solidFill>
-                  <a:srgbClr val="F59200"/>
-                </a:solidFill>
-                <a:effectLst/>
-                <a:latin typeface="Calibri-Light"/>
-                <a:ea typeface="Calibri" panose="020F0502020204030204" pitchFamily="34" charset="0"/>
-                <a:cs typeface="Calibri-Light"/>
+              <a:t>All material (timetable, slides, </a:t>
+            </a:r>
+            <a:r>
+              <a:rPr lang="en-GB" sz="2000" dirty="0" err="1"/>
+              <a:t>practicals</a:t>
+            </a:r>
+            <a:r>
+              <a:rPr lang="en-GB" sz="2000" dirty="0"/>
+              <a:t> etc) on the course website:</a:t>
+            </a:r>
+          </a:p>
+          <a:p>
+            <a:pPr algn="ctr">
+              <a:spcBef>
+                <a:spcPts val="0"/>
+              </a:spcBef>
+              <a:spcAft>
+                <a:spcPts val="1200"/>
+              </a:spcAft>
+            </a:pPr>
+            <a:r>
+              <a:rPr lang="en-GB" sz="2000" dirty="0"/>
+              <a:t> </a:t>
+            </a:r>
+            <a:r>
+              <a:rPr lang="en-GB" sz="2400" dirty="0">
+                <a:hlinkClick r:id="rId3"/>
               </a:rPr>
-              <a:t>https://</a:t>
-            </a:r>
-            <a:r>
-              <a:rPr lang="en-GB" sz="1800" dirty="0" err="1">
-                <a:solidFill>
-                  <a:srgbClr val="F59200"/>
-                </a:solidFill>
-                <a:effectLst/>
-                <a:latin typeface="Calibri-Light"/>
-                <a:ea typeface="Calibri" panose="020F0502020204030204" pitchFamily="34" charset="0"/>
-                <a:cs typeface="Calibri-Light"/>
-              </a:rPr>
-              <a:t>ble.lshtm.ac.uk</a:t>
-            </a:r>
-            <a:r>
-              <a:rPr lang="en-GB" sz="1800" dirty="0">
-                <a:solidFill>
-                  <a:srgbClr val="F59200"/>
-                </a:solidFill>
-                <a:effectLst/>
-                <a:latin typeface="Calibri-Light"/>
-                <a:ea typeface="Calibri" panose="020F0502020204030204" pitchFamily="34" charset="0"/>
-                <a:cs typeface="Calibri-Light"/>
-              </a:rPr>
-              <a:t>/</a:t>
-            </a:r>
+              <a:t>cmmid.github.io/mtm</a:t>
+            </a:r>
+            <a:endParaRPr lang="en-GB" sz="2400" dirty="0"/>
+          </a:p>
+          <a:p>
+            <a:pPr>
+              <a:spcBef>
+                <a:spcPts val="0"/>
+              </a:spcBef>
+              <a:spcAft>
+                <a:spcPts val="1200"/>
+              </a:spcAft>
+            </a:pPr>
             <a:br>
-              <a:rPr lang="en-GB" sz="2000" dirty="0"/>
+              <a:rPr lang="en-GB" sz="800" dirty="0"/>
             </a:br>
             <a:r>
               <a:rPr lang="en-GB" sz="1600" dirty="0"/>
-              <a:t>(shout out now if you haven’t logged-in! Or cannot access </a:t>
+              <a:t>      (shout out now if you haven’t logged-in! Or cannot access </a:t>
             </a:r>
             <a:r>
               <a:rPr lang="en-GB" sz="1600" dirty="0" err="1"/>
@@ -3919,7 +3851,19 @@
             </a:pPr>
             <a:r>
               <a:rPr lang="en-GB" sz="2000" dirty="0"/>
-              <a:t>Lecture slides on Moodle (and lecture recordings at end of each day)</a:t>
+              <a:t>Lecture recordings on Moodle (</a:t>
+            </a:r>
+            <a:r>
+              <a:rPr lang="en-GB" sz="2000" u="sng" dirty="0" err="1">
+                <a:solidFill>
+                  <a:schemeClr val="accent3"/>
+                </a:solidFill>
+              </a:rPr>
+              <a:t>ble.lshtm.ac.uk</a:t>
+            </a:r>
+            <a:r>
+              <a:rPr lang="en-GB" sz="2000" dirty="0"/>
+              <a:t>) at the end of each day</a:t>
             </a:r>
           </a:p>
           <a:p>
@@ -3935,7 +3879,7 @@
             </a:pPr>
             <a:r>
               <a:rPr lang="en-GB" sz="2000" dirty="0"/>
-              <a:t>Practical session exercises and solutions will be downloaded via R package (details to follow in next session)</a:t>
+              <a:t>Practical session exercises and solutions on the web site</a:t>
             </a:r>
             <a:br>
               <a:rPr lang="en-GB" sz="2000" dirty="0"/>

</xml_diff>

<commit_message>
Update to practical 3 solutions
</commit_message>
<xml_diff>
--- a/slides/Lecture_01_Intro.pptx
+++ b/slides/Lecture_01_Intro.pptx
@@ -8,14 +8,14 @@
     <p:notesMasterId r:id="rId10"/>
   </p:notesMasterIdLst>
   <p:sldIdLst>
-    <p:sldId id="256" r:id="rId2"/>
-    <p:sldId id="270" r:id="rId3"/>
-    <p:sldId id="268" r:id="rId4"/>
-    <p:sldId id="266" r:id="rId5"/>
-    <p:sldId id="271" r:id="rId6"/>
-    <p:sldId id="257" r:id="rId7"/>
-    <p:sldId id="269" r:id="rId8"/>
-    <p:sldId id="272" r:id="rId9"/>
+    <p:sldId id="273" r:id="rId2"/>
+    <p:sldId id="274" r:id="rId3"/>
+    <p:sldId id="275" r:id="rId4"/>
+    <p:sldId id="276" r:id="rId5"/>
+    <p:sldId id="277" r:id="rId6"/>
+    <p:sldId id="278" r:id="rId7"/>
+    <p:sldId id="279" r:id="rId8"/>
+    <p:sldId id="280" r:id="rId9"/>
   </p:sldIdLst>
   <p:sldSz cx="9144000" cy="6858000" type="screen4x3"/>
   <p:notesSz cx="6858000" cy="9144000"/>
@@ -204,7 +204,7 @@
           <a:p>
             <a:fld id="{92C08CDA-29C6-4C4F-9345-278F31C990CA}" type="datetimeFigureOut">
               <a:rPr lang="en-GB" smtClean="0"/>
-              <a:t>02/09/2024</a:t>
+              <a:t>09/09/2024</a:t>
             </a:fld>
             <a:endParaRPr lang="en-GB"/>
           </a:p>
@@ -3005,7 +3005,23 @@
                 <a:ea typeface="Open Sans" panose="020B0606030504020204" pitchFamily="34" charset="0"/>
                 <a:cs typeface="Open Sans" panose="020B0606030504020204" pitchFamily="34" charset="0"/>
               </a:rPr>
-              <a:t>Damian Keane </a:t>
+              <a:t>Francesco </a:t>
+            </a:r>
+            <a:r>
+              <a:rPr lang="en-GB" sz="2000" dirty="0" err="1">
+                <a:latin typeface="Open Sans" panose="020B0606030504020204" pitchFamily="34" charset="0"/>
+                <a:ea typeface="Open Sans" panose="020B0606030504020204" pitchFamily="34" charset="0"/>
+                <a:cs typeface="Open Sans" panose="020B0606030504020204" pitchFamily="34" charset="0"/>
+              </a:rPr>
+              <a:t>Grisolia</a:t>
+            </a:r>
+            <a:r>
+              <a:rPr lang="en-GB" sz="2000" dirty="0">
+                <a:latin typeface="Open Sans" panose="020B0606030504020204" pitchFamily="34" charset="0"/>
+                <a:ea typeface="Open Sans" panose="020B0606030504020204" pitchFamily="34" charset="0"/>
+                <a:cs typeface="Open Sans" panose="020B0606030504020204" pitchFamily="34" charset="0"/>
+              </a:rPr>
+              <a:t> </a:t>
             </a:r>
             <a:r>
               <a:rPr lang="en-GB" sz="2000" dirty="0">
@@ -3014,7 +3030,7 @@
                 <a:cs typeface="Open Sans" panose="020B0606030504020204" pitchFamily="34" charset="0"/>
                 <a:hlinkClick r:id="rId5"/>
               </a:rPr>
-              <a:t>Damian.Keane@lshtm.ac.uk</a:t>
+              <a:t>Francesco.Grisolia@lshtm.ac.uk</a:t>
             </a:r>
             <a:endParaRPr lang="en-GB" sz="2000" dirty="0">
               <a:latin typeface="Open Sans" panose="020B0606030504020204" pitchFamily="34" charset="0"/>
@@ -3147,7 +3163,7 @@
     </p:spTree>
     <p:extLst>
       <p:ext uri="{BB962C8B-B14F-4D97-AF65-F5344CB8AC3E}">
-        <p14:creationId xmlns:p14="http://schemas.microsoft.com/office/powerpoint/2010/main" val="1384522095"/>
+        <p14:creationId xmlns:p14="http://schemas.microsoft.com/office/powerpoint/2010/main" val="2231965453"/>
       </p:ext>
     </p:extLst>
   </p:cSld>
@@ -3324,7 +3340,7 @@
     </p:spTree>
     <p:extLst>
       <p:ext uri="{BB962C8B-B14F-4D97-AF65-F5344CB8AC3E}">
-        <p14:creationId xmlns:p14="http://schemas.microsoft.com/office/powerpoint/2010/main" val="2576761085"/>
+        <p14:creationId xmlns:p14="http://schemas.microsoft.com/office/powerpoint/2010/main" val="2541089041"/>
       </p:ext>
     </p:extLst>
   </p:cSld>
@@ -3636,7 +3652,7 @@
     </p:spTree>
     <p:extLst>
       <p:ext uri="{BB962C8B-B14F-4D97-AF65-F5344CB8AC3E}">
-        <p14:creationId xmlns:p14="http://schemas.microsoft.com/office/powerpoint/2010/main" val="3784887771"/>
+        <p14:creationId xmlns:p14="http://schemas.microsoft.com/office/powerpoint/2010/main" val="2082863727"/>
       </p:ext>
     </p:extLst>
   </p:cSld>
@@ -3968,7 +3984,7 @@
     </p:spTree>
     <p:extLst>
       <p:ext uri="{BB962C8B-B14F-4D97-AF65-F5344CB8AC3E}">
-        <p14:creationId xmlns:p14="http://schemas.microsoft.com/office/powerpoint/2010/main" val="2125231730"/>
+        <p14:creationId xmlns:p14="http://schemas.microsoft.com/office/powerpoint/2010/main" val="2461663890"/>
       </p:ext>
     </p:extLst>
   </p:cSld>
@@ -4358,7 +4374,7 @@
     </p:spTree>
     <p:extLst>
       <p:ext uri="{BB962C8B-B14F-4D97-AF65-F5344CB8AC3E}">
-        <p14:creationId xmlns:p14="http://schemas.microsoft.com/office/powerpoint/2010/main" val="492800716"/>
+        <p14:creationId xmlns:p14="http://schemas.microsoft.com/office/powerpoint/2010/main" val="3497848802"/>
       </p:ext>
     </p:extLst>
   </p:cSld>
@@ -4408,7 +4424,7 @@
           <a:p>
             <a:r>
               <a:rPr lang="en-US" dirty="0"/>
-              <a:t>Introduce yourself within your Room</a:t>
+              <a:t>Introduce yourself</a:t>
             </a:r>
             <a:br>
               <a:rPr lang="en-US" dirty="0"/>
@@ -4416,9 +4432,6 @@
             <a:br>
               <a:rPr lang="en-US" dirty="0"/>
             </a:br>
-            <a:br>
-              <a:rPr lang="en-US" dirty="0"/>
-            </a:br>
             <a:r>
               <a:rPr lang="en-US" dirty="0"/>
               <a:t>Give your </a:t>
@@ -4441,25 +4454,6 @@
             <a:br>
               <a:rPr lang="en-US" b="1" dirty="0"/>
             </a:br>
-            <a:br>
-              <a:rPr lang="en-US" b="1" dirty="0"/>
-            </a:br>
-            <a:r>
-              <a:rPr lang="en-US" b="1" dirty="0"/>
-              <a:t>Come back together in 10 minutes</a:t>
-            </a:r>
-            <a:br>
-              <a:rPr lang="en-US" b="1" dirty="0"/>
-            </a:br>
-            <a:br>
-              <a:rPr lang="en-US" b="1" dirty="0"/>
-            </a:br>
-            <a:br>
-              <a:rPr lang="en-US" b="1" dirty="0"/>
-            </a:br>
-            <a:br>
-              <a:rPr lang="en-US" b="1" dirty="0"/>
-            </a:br>
             <a:r>
               <a:rPr lang="en-US" dirty="0"/>
               <a:t>Use the </a:t>
@@ -4470,15 +4464,7 @@
             </a:r>
             <a:r>
               <a:rPr lang="en-US" dirty="0"/>
-              <a:t>to introduce yourself more fully should you wish or pose any </a:t>
-            </a:r>
-            <a:r>
-              <a:rPr lang="en-US"/>
-              <a:t>questions for your </a:t>
-            </a:r>
-            <a:r>
-              <a:rPr lang="en-US" dirty="0"/>
-              <a:t>colleagues</a:t>
+              <a:t>to introduce yourself more fully should you wish or pose any questions for your colleagues</a:t>
             </a:r>
           </a:p>
         </p:txBody>
@@ -4543,7 +4529,7 @@
     </p:spTree>
     <p:extLst>
       <p:ext uri="{BB962C8B-B14F-4D97-AF65-F5344CB8AC3E}">
-        <p14:creationId xmlns:p14="http://schemas.microsoft.com/office/powerpoint/2010/main" val="1652218259"/>
+        <p14:creationId xmlns:p14="http://schemas.microsoft.com/office/powerpoint/2010/main" val="2991955999"/>
       </p:ext>
     </p:extLst>
   </p:cSld>

</xml_diff>